<commit_message>
Made changes to PPT. Began formal data normalization and PGAdmin uploading for all data. Renamed Tax Cleaning ipynb file to Data Normalization.
</commit_message>
<xml_diff>
--- a/Education and Taxes.pptx
+++ b/Education and Taxes.pptx
@@ -106,6 +106,11 @@
       </a:defRPr>
     </a:lvl9pPr>
   </p:defaultTextStyle>
+  <p:extLst>
+    <p:ext uri="{EFAFB233-063F-42B5-8137-9DF3F51BA10A}">
+      <p15:sldGuideLst xmlns:p15="http://schemas.microsoft.com/office/powerpoint/2012/main"/>
+    </p:ext>
+  </p:extLst>
 </p:presentation>
 </file>
 
@@ -256,7 +261,7 @@
           <a:p>
             <a:fld id="{A67510C0-1DDF-449A-ABA0-01D9B08E9DA6}" type="datetimeFigureOut">
               <a:rPr lang="en-US" smtClean="0"/>
-              <a:t>9/8/2021</a:t>
+              <a:t>9/12/2021</a:t>
             </a:fld>
             <a:endParaRPr lang="en-US"/>
           </a:p>
@@ -454,7 +459,7 @@
           <a:p>
             <a:fld id="{A67510C0-1DDF-449A-ABA0-01D9B08E9DA6}" type="datetimeFigureOut">
               <a:rPr lang="en-US" smtClean="0"/>
-              <a:t>9/8/2021</a:t>
+              <a:t>9/12/2021</a:t>
             </a:fld>
             <a:endParaRPr lang="en-US"/>
           </a:p>
@@ -662,7 +667,7 @@
           <a:p>
             <a:fld id="{A67510C0-1DDF-449A-ABA0-01D9B08E9DA6}" type="datetimeFigureOut">
               <a:rPr lang="en-US" smtClean="0"/>
-              <a:t>9/8/2021</a:t>
+              <a:t>9/12/2021</a:t>
             </a:fld>
             <a:endParaRPr lang="en-US"/>
           </a:p>
@@ -860,7 +865,7 @@
           <a:p>
             <a:fld id="{A67510C0-1DDF-449A-ABA0-01D9B08E9DA6}" type="datetimeFigureOut">
               <a:rPr lang="en-US" smtClean="0"/>
-              <a:t>9/8/2021</a:t>
+              <a:t>9/12/2021</a:t>
             </a:fld>
             <a:endParaRPr lang="en-US"/>
           </a:p>
@@ -1135,7 +1140,7 @@
           <a:p>
             <a:fld id="{A67510C0-1DDF-449A-ABA0-01D9B08E9DA6}" type="datetimeFigureOut">
               <a:rPr lang="en-US" smtClean="0"/>
-              <a:t>9/8/2021</a:t>
+              <a:t>9/12/2021</a:t>
             </a:fld>
             <a:endParaRPr lang="en-US"/>
           </a:p>
@@ -1400,7 +1405,7 @@
           <a:p>
             <a:fld id="{A67510C0-1DDF-449A-ABA0-01D9B08E9DA6}" type="datetimeFigureOut">
               <a:rPr lang="en-US" smtClean="0"/>
-              <a:t>9/8/2021</a:t>
+              <a:t>9/12/2021</a:t>
             </a:fld>
             <a:endParaRPr lang="en-US"/>
           </a:p>
@@ -1812,7 +1817,7 @@
           <a:p>
             <a:fld id="{A67510C0-1DDF-449A-ABA0-01D9B08E9DA6}" type="datetimeFigureOut">
               <a:rPr lang="en-US" smtClean="0"/>
-              <a:t>9/8/2021</a:t>
+              <a:t>9/12/2021</a:t>
             </a:fld>
             <a:endParaRPr lang="en-US"/>
           </a:p>
@@ -1953,7 +1958,7 @@
           <a:p>
             <a:fld id="{A67510C0-1DDF-449A-ABA0-01D9B08E9DA6}" type="datetimeFigureOut">
               <a:rPr lang="en-US" smtClean="0"/>
-              <a:t>9/8/2021</a:t>
+              <a:t>9/12/2021</a:t>
             </a:fld>
             <a:endParaRPr lang="en-US"/>
           </a:p>
@@ -2066,7 +2071,7 @@
           <a:p>
             <a:fld id="{A67510C0-1DDF-449A-ABA0-01D9B08E9DA6}" type="datetimeFigureOut">
               <a:rPr lang="en-US" smtClean="0"/>
-              <a:t>9/8/2021</a:t>
+              <a:t>9/12/2021</a:t>
             </a:fld>
             <a:endParaRPr lang="en-US"/>
           </a:p>
@@ -2377,7 +2382,7 @@
           <a:p>
             <a:fld id="{A67510C0-1DDF-449A-ABA0-01D9B08E9DA6}" type="datetimeFigureOut">
               <a:rPr lang="en-US" smtClean="0"/>
-              <a:t>9/8/2021</a:t>
+              <a:t>9/12/2021</a:t>
             </a:fld>
             <a:endParaRPr lang="en-US"/>
           </a:p>
@@ -2665,7 +2670,7 @@
           <a:p>
             <a:fld id="{A67510C0-1DDF-449A-ABA0-01D9B08E9DA6}" type="datetimeFigureOut">
               <a:rPr lang="en-US" smtClean="0"/>
-              <a:t>9/8/2021</a:t>
+              <a:t>9/12/2021</a:t>
             </a:fld>
             <a:endParaRPr lang="en-US"/>
           </a:p>
@@ -2906,7 +2911,7 @@
           <a:p>
             <a:fld id="{A67510C0-1DDF-449A-ABA0-01D9B08E9DA6}" type="datetimeFigureOut">
               <a:rPr lang="en-US" smtClean="0"/>
-              <a:t>9/8/2021</a:t>
+              <a:t>9/12/2021</a:t>
             </a:fld>
             <a:endParaRPr lang="en-US"/>
           </a:p>
@@ -4877,7 +4882,7 @@
           <a:p>
             <a:r>
               <a:rPr lang="en-US" sz="1700" dirty="0"/>
-              <a:t>Zip codes with greater educational availability (defined: number of public schools K-12 and colleges) has higher per capita income and higher percentage of electronic tax fillings with direct deposit returns. </a:t>
+              <a:t>Zip codes with greater educational availability (defined: number of public schools K-12 and colleges) have higher per capita income and higher percentage of electronic tax fillings with direct deposit returns. </a:t>
             </a:r>
           </a:p>
           <a:p>

</xml_diff>